<commit_message>
Add anthropometric dimensions fig
</commit_message>
<xml_diff>
--- a/figs/Anthro_Dimensions.pptx
+++ b/figs/Anthro_Dimensions.pptx
@@ -6,9 +6,10 @@
   </p:sldMasterIdLst>
   <p:sldIdLst>
     <p:sldId id="257" r:id="rId2"/>
-    <p:sldId id="256" r:id="rId3"/>
+    <p:sldId id="258" r:id="rId3"/>
+    <p:sldId id="256" r:id="rId4"/>
   </p:sldIdLst>
-  <p:sldSz cx="8229600" cy="10972800"/>
+  <p:sldSz cx="8229600" cy="10972800" type="B4JIS"/>
   <p:notesSz cx="6858000" cy="9144000"/>
   <p:defaultTextStyle>
     <a:defPPr>
@@ -289,7 +290,7 @@
           <a:p>
             <a:fld id="{F4F539D1-F9CB-D34D-908B-37C76B4EC692}" type="datetimeFigureOut">
               <a:rPr lang="en-US" smtClean="0"/>
-              <a:t>9/8/12</a:t>
+              <a:t>3/23/15</a:t>
             </a:fld>
             <a:endParaRPr lang="en-US"/>
           </a:p>
@@ -459,7 +460,7 @@
           <a:p>
             <a:fld id="{F4F539D1-F9CB-D34D-908B-37C76B4EC692}" type="datetimeFigureOut">
               <a:rPr lang="en-US" smtClean="0"/>
-              <a:t>9/8/12</a:t>
+              <a:t>3/23/15</a:t>
             </a:fld>
             <a:endParaRPr lang="en-US"/>
           </a:p>
@@ -639,7 +640,7 @@
           <a:p>
             <a:fld id="{F4F539D1-F9CB-D34D-908B-37C76B4EC692}" type="datetimeFigureOut">
               <a:rPr lang="en-US" smtClean="0"/>
-              <a:t>9/8/12</a:t>
+              <a:t>3/23/15</a:t>
             </a:fld>
             <a:endParaRPr lang="en-US"/>
           </a:p>
@@ -809,7 +810,7 @@
           <a:p>
             <a:fld id="{F4F539D1-F9CB-D34D-908B-37C76B4EC692}" type="datetimeFigureOut">
               <a:rPr lang="en-US" smtClean="0"/>
-              <a:t>9/8/12</a:t>
+              <a:t>3/23/15</a:t>
             </a:fld>
             <a:endParaRPr lang="en-US"/>
           </a:p>
@@ -1055,7 +1056,7 @@
           <a:p>
             <a:fld id="{F4F539D1-F9CB-D34D-908B-37C76B4EC692}" type="datetimeFigureOut">
               <a:rPr lang="en-US" smtClean="0"/>
-              <a:t>9/8/12</a:t>
+              <a:t>3/23/15</a:t>
             </a:fld>
             <a:endParaRPr lang="en-US"/>
           </a:p>
@@ -1343,7 +1344,7 @@
           <a:p>
             <a:fld id="{F4F539D1-F9CB-D34D-908B-37C76B4EC692}" type="datetimeFigureOut">
               <a:rPr lang="en-US" smtClean="0"/>
-              <a:t>9/8/12</a:t>
+              <a:t>3/23/15</a:t>
             </a:fld>
             <a:endParaRPr lang="en-US"/>
           </a:p>
@@ -1765,7 +1766,7 @@
           <a:p>
             <a:fld id="{F4F539D1-F9CB-D34D-908B-37C76B4EC692}" type="datetimeFigureOut">
               <a:rPr lang="en-US" smtClean="0"/>
-              <a:t>9/8/12</a:t>
+              <a:t>3/23/15</a:t>
             </a:fld>
             <a:endParaRPr lang="en-US"/>
           </a:p>
@@ -1883,7 +1884,7 @@
           <a:p>
             <a:fld id="{F4F539D1-F9CB-D34D-908B-37C76B4EC692}" type="datetimeFigureOut">
               <a:rPr lang="en-US" smtClean="0"/>
-              <a:t>9/8/12</a:t>
+              <a:t>3/23/15</a:t>
             </a:fld>
             <a:endParaRPr lang="en-US"/>
           </a:p>
@@ -1978,7 +1979,7 @@
           <a:p>
             <a:fld id="{F4F539D1-F9CB-D34D-908B-37C76B4EC692}" type="datetimeFigureOut">
               <a:rPr lang="en-US" smtClean="0"/>
-              <a:t>9/8/12</a:t>
+              <a:t>3/23/15</a:t>
             </a:fld>
             <a:endParaRPr lang="en-US"/>
           </a:p>
@@ -2255,7 +2256,7 @@
           <a:p>
             <a:fld id="{F4F539D1-F9CB-D34D-908B-37C76B4EC692}" type="datetimeFigureOut">
               <a:rPr lang="en-US" smtClean="0"/>
-              <a:t>9/8/12</a:t>
+              <a:t>3/23/15</a:t>
             </a:fld>
             <a:endParaRPr lang="en-US"/>
           </a:p>
@@ -2508,7 +2509,7 @@
           <a:p>
             <a:fld id="{F4F539D1-F9CB-D34D-908B-37C76B4EC692}" type="datetimeFigureOut">
               <a:rPr lang="en-US" smtClean="0"/>
-              <a:t>9/8/12</a:t>
+              <a:t>3/23/15</a:t>
             </a:fld>
             <a:endParaRPr lang="en-US"/>
           </a:p>
@@ -2721,7 +2722,7 @@
           <a:p>
             <a:fld id="{F4F539D1-F9CB-D34D-908B-37C76B4EC692}" type="datetimeFigureOut">
               <a:rPr lang="en-US" smtClean="0"/>
-              <a:t>9/8/12</a:t>
+              <a:t>3/23/15</a:t>
             </a:fld>
             <a:endParaRPr lang="en-US"/>
           </a:p>
@@ -3104,7 +3105,7 @@
         </p:nvGrpSpPr>
         <p:grpSpPr>
           <a:xfrm>
-            <a:off x="637211" y="765255"/>
+            <a:off x="226317" y="765255"/>
             <a:ext cx="4826000" cy="9940456"/>
             <a:chOff x="1701800" y="317007"/>
             <a:chExt cx="4826000" cy="9940456"/>
@@ -3202,7 +3203,7 @@
         </p:nvCxnSpPr>
         <p:spPr>
           <a:xfrm>
-            <a:off x="2147867" y="4968414"/>
+            <a:off x="1736973" y="4968414"/>
             <a:ext cx="3315344" cy="0"/>
           </a:xfrm>
           <a:prstGeom prst="line">
@@ -3239,7 +3240,7 @@
         </p:nvCxnSpPr>
         <p:spPr>
           <a:xfrm>
-            <a:off x="2147867" y="2636759"/>
+            <a:off x="1736973" y="2636759"/>
             <a:ext cx="3315344" cy="0"/>
           </a:xfrm>
           <a:prstGeom prst="line">
@@ -3276,7 +3277,7 @@
         </p:nvCxnSpPr>
         <p:spPr>
           <a:xfrm>
-            <a:off x="2147867" y="3841347"/>
+            <a:off x="1736973" y="4326951"/>
             <a:ext cx="3315344" cy="0"/>
           </a:xfrm>
           <a:prstGeom prst="line">
@@ -3313,7 +3314,7 @@
         </p:nvCxnSpPr>
         <p:spPr>
           <a:xfrm>
-            <a:off x="2147867" y="8295922"/>
+            <a:off x="1736973" y="8295922"/>
             <a:ext cx="3315344" cy="0"/>
           </a:xfrm>
           <a:prstGeom prst="line">
@@ -3342,6 +3343,292 @@
           </a:fontRef>
         </p:style>
       </p:cxnSp>
+      <p:sp>
+        <p:nvSpPr>
+          <p:cNvPr id="3" name="TextBox 2"/>
+          <p:cNvSpPr txBox="1"/>
+          <p:nvPr/>
+        </p:nvSpPr>
+        <p:spPr>
+          <a:xfrm>
+            <a:off x="5033640" y="760538"/>
+            <a:ext cx="1123124" cy="338554"/>
+          </a:xfrm>
+          <a:prstGeom prst="rect">
+            <a:avLst/>
+          </a:prstGeom>
+          <a:noFill/>
+        </p:spPr>
+        <p:txBody>
+          <a:bodyPr wrap="none" rtlCol="0">
+            <a:spAutoFit/>
+          </a:bodyPr>
+          <a:lstStyle/>
+          <a:p>
+            <a:r>
+              <a:rPr lang="en-US" sz="1600" b="1" dirty="0" smtClean="0">
+                <a:latin typeface="Arial"/>
+                <a:cs typeface="Arial"/>
+              </a:rPr>
+              <a:t>STATURE</a:t>
+            </a:r>
+            <a:endParaRPr lang="en-US" sz="1600" b="1" dirty="0">
+              <a:latin typeface="Arial"/>
+              <a:cs typeface="Arial"/>
+            </a:endParaRPr>
+          </a:p>
+        </p:txBody>
+      </p:sp>
+      <p:cxnSp>
+        <p:nvCxnSpPr>
+          <p:cNvPr id="10" name="Straight Connector 9"/>
+          <p:cNvCxnSpPr/>
+          <p:nvPr/>
+        </p:nvCxnSpPr>
+        <p:spPr>
+          <a:xfrm>
+            <a:off x="1736973" y="996157"/>
+            <a:ext cx="3315344" cy="0"/>
+          </a:xfrm>
+          <a:prstGeom prst="line">
+            <a:avLst/>
+          </a:prstGeom>
+          <a:ln>
+            <a:solidFill>
+              <a:srgbClr val="DF0202"/>
+            </a:solidFill>
+            <a:prstDash val="sysDash"/>
+          </a:ln>
+          <a:effectLst/>
+        </p:spPr>
+        <p:style>
+          <a:lnRef idx="2">
+            <a:schemeClr val="accent1"/>
+          </a:lnRef>
+          <a:fillRef idx="0">
+            <a:schemeClr val="accent1"/>
+          </a:fillRef>
+          <a:effectRef idx="1">
+            <a:schemeClr val="accent1"/>
+          </a:effectRef>
+          <a:fontRef idx="minor">
+            <a:schemeClr val="tx1"/>
+          </a:fontRef>
+        </p:style>
+      </p:cxnSp>
+      <p:cxnSp>
+        <p:nvCxnSpPr>
+          <p:cNvPr id="11" name="Straight Connector 10"/>
+          <p:cNvCxnSpPr/>
+          <p:nvPr/>
+        </p:nvCxnSpPr>
+        <p:spPr>
+          <a:xfrm>
+            <a:off x="1736973" y="10446772"/>
+            <a:ext cx="3315344" cy="0"/>
+          </a:xfrm>
+          <a:prstGeom prst="line">
+            <a:avLst/>
+          </a:prstGeom>
+          <a:ln>
+            <a:solidFill>
+              <a:srgbClr val="DF0202"/>
+            </a:solidFill>
+            <a:prstDash val="sysDash"/>
+          </a:ln>
+          <a:effectLst/>
+        </p:spPr>
+        <p:style>
+          <a:lnRef idx="2">
+            <a:schemeClr val="accent1"/>
+          </a:lnRef>
+          <a:fillRef idx="0">
+            <a:schemeClr val="accent1"/>
+          </a:fillRef>
+          <a:effectRef idx="1">
+            <a:schemeClr val="accent1"/>
+          </a:effectRef>
+          <a:fontRef idx="minor">
+            <a:schemeClr val="tx1"/>
+          </a:fontRef>
+        </p:style>
+      </p:cxnSp>
+      <p:sp>
+        <p:nvSpPr>
+          <p:cNvPr id="16" name="TextBox 15"/>
+          <p:cNvSpPr txBox="1"/>
+          <p:nvPr/>
+        </p:nvSpPr>
+        <p:spPr>
+          <a:xfrm>
+            <a:off x="5033640" y="10216732"/>
+            <a:ext cx="1123124" cy="338554"/>
+          </a:xfrm>
+          <a:prstGeom prst="rect">
+            <a:avLst/>
+          </a:prstGeom>
+          <a:noFill/>
+        </p:spPr>
+        <p:txBody>
+          <a:bodyPr wrap="none" rtlCol="0">
+            <a:spAutoFit/>
+          </a:bodyPr>
+          <a:lstStyle/>
+          <a:p>
+            <a:r>
+              <a:rPr lang="en-US" sz="1600" b="1" dirty="0" smtClean="0">
+                <a:latin typeface="Arial"/>
+                <a:cs typeface="Arial"/>
+              </a:rPr>
+              <a:t>STATURE</a:t>
+            </a:r>
+            <a:endParaRPr lang="en-US" sz="1600" b="1" dirty="0">
+              <a:latin typeface="Arial"/>
+              <a:cs typeface="Arial"/>
+            </a:endParaRPr>
+          </a:p>
+        </p:txBody>
+      </p:sp>
+      <p:sp>
+        <p:nvSpPr>
+          <p:cNvPr id="17" name="TextBox 16"/>
+          <p:cNvSpPr txBox="1"/>
+          <p:nvPr/>
+        </p:nvSpPr>
+        <p:spPr>
+          <a:xfrm>
+            <a:off x="5033640" y="2433416"/>
+            <a:ext cx="2700278" cy="338554"/>
+          </a:xfrm>
+          <a:prstGeom prst="rect">
+            <a:avLst/>
+          </a:prstGeom>
+          <a:noFill/>
+        </p:spPr>
+        <p:txBody>
+          <a:bodyPr wrap="none" rtlCol="0">
+            <a:spAutoFit/>
+          </a:bodyPr>
+          <a:lstStyle/>
+          <a:p>
+            <a:r>
+              <a:rPr lang="en-US" sz="1600" b="1" dirty="0" smtClean="0">
+                <a:latin typeface="Arial"/>
+                <a:cs typeface="Arial"/>
+              </a:rPr>
+              <a:t>SUPRASTERNAL HEIGHT</a:t>
+            </a:r>
+            <a:endParaRPr lang="en-US" sz="1600" b="1" dirty="0">
+              <a:latin typeface="Arial"/>
+              <a:cs typeface="Arial"/>
+            </a:endParaRPr>
+          </a:p>
+        </p:txBody>
+      </p:sp>
+      <p:sp>
+        <p:nvSpPr>
+          <p:cNvPr id="18" name="TextBox 17"/>
+          <p:cNvSpPr txBox="1"/>
+          <p:nvPr/>
+        </p:nvSpPr>
+        <p:spPr>
+          <a:xfrm>
+            <a:off x="5033640" y="4758047"/>
+            <a:ext cx="2977398" cy="338554"/>
+          </a:xfrm>
+          <a:prstGeom prst="rect">
+            <a:avLst/>
+          </a:prstGeom>
+          <a:noFill/>
+        </p:spPr>
+        <p:txBody>
+          <a:bodyPr wrap="none" rtlCol="0">
+            <a:spAutoFit/>
+          </a:bodyPr>
+          <a:lstStyle/>
+          <a:p>
+            <a:r>
+              <a:rPr lang="en-US" sz="1600" b="1" dirty="0" smtClean="0">
+                <a:latin typeface="Arial"/>
+                <a:cs typeface="Arial"/>
+              </a:rPr>
+              <a:t>WAIST HEIGHT OMPHALION</a:t>
+            </a:r>
+            <a:endParaRPr lang="en-US" sz="1600" b="1" dirty="0">
+              <a:latin typeface="Arial"/>
+              <a:cs typeface="Arial"/>
+            </a:endParaRPr>
+          </a:p>
+        </p:txBody>
+      </p:sp>
+      <p:sp>
+        <p:nvSpPr>
+          <p:cNvPr id="19" name="TextBox 18"/>
+          <p:cNvSpPr txBox="1"/>
+          <p:nvPr/>
+        </p:nvSpPr>
+        <p:spPr>
+          <a:xfrm>
+            <a:off x="5033640" y="8092579"/>
+            <a:ext cx="2364750" cy="338554"/>
+          </a:xfrm>
+          <a:prstGeom prst="rect">
+            <a:avLst/>
+          </a:prstGeom>
+          <a:noFill/>
+        </p:spPr>
+        <p:txBody>
+          <a:bodyPr wrap="none" rtlCol="0">
+            <a:spAutoFit/>
+          </a:bodyPr>
+          <a:lstStyle/>
+          <a:p>
+            <a:r>
+              <a:rPr lang="en-US" sz="1600" b="1" dirty="0" smtClean="0">
+                <a:latin typeface="Arial"/>
+                <a:cs typeface="Arial"/>
+              </a:rPr>
+              <a:t>PATELLA MID HEIGHT</a:t>
+            </a:r>
+          </a:p>
+        </p:txBody>
+      </p:sp>
+      <p:sp>
+        <p:nvSpPr>
+          <p:cNvPr id="20" name="TextBox 19"/>
+          <p:cNvSpPr txBox="1"/>
+          <p:nvPr/>
+        </p:nvSpPr>
+        <p:spPr>
+          <a:xfrm>
+            <a:off x="5033640" y="4123608"/>
+            <a:ext cx="2696171" cy="338554"/>
+          </a:xfrm>
+          <a:prstGeom prst="rect">
+            <a:avLst/>
+          </a:prstGeom>
+          <a:noFill/>
+        </p:spPr>
+        <p:txBody>
+          <a:bodyPr wrap="none" rtlCol="0">
+            <a:spAutoFit/>
+          </a:bodyPr>
+          <a:lstStyle/>
+          <a:p>
+            <a:r>
+              <a:rPr lang="en-US" sz="1600" b="1" dirty="0" smtClean="0">
+                <a:latin typeface="Arial"/>
+                <a:cs typeface="Arial"/>
+              </a:rPr>
+              <a:t>WAIST HEIGHT NATURAL</a:t>
+            </a:r>
+            <a:endParaRPr lang="en-US" sz="1600" b="1" dirty="0">
+              <a:latin typeface="Arial"/>
+              <a:cs typeface="Arial"/>
+            </a:endParaRPr>
+          </a:p>
+        </p:txBody>
+      </p:sp>
     </p:spTree>
     <p:extLst>
       <p:ext uri="{BB962C8B-B14F-4D97-AF65-F5344CB8AC3E}">
@@ -3363,6 +3650,356 @@
 </file>
 
 <file path=ppt/slides/slide2.xml><?xml version="1.0" encoding="utf-8"?>
+<p:sld xmlns:a="http://schemas.openxmlformats.org/drawingml/2006/main" xmlns:r="http://schemas.openxmlformats.org/officeDocument/2006/relationships" xmlns:p="http://schemas.openxmlformats.org/presentationml/2006/main">
+  <p:cSld>
+    <p:spTree>
+      <p:nvGrpSpPr>
+        <p:cNvPr id="1" name=""/>
+        <p:cNvGrpSpPr/>
+        <p:nvPr/>
+      </p:nvGrpSpPr>
+      <p:grpSpPr>
+        <a:xfrm>
+          <a:off x="0" y="0"/>
+          <a:ext cx="0" cy="0"/>
+          <a:chOff x="0" y="0"/>
+          <a:chExt cx="0" cy="0"/>
+        </a:xfrm>
+      </p:grpSpPr>
+      <p:grpSp>
+        <p:nvGrpSpPr>
+          <p:cNvPr id="2" name="Group 1"/>
+          <p:cNvGrpSpPr/>
+          <p:nvPr/>
+        </p:nvGrpSpPr>
+        <p:grpSpPr>
+          <a:xfrm>
+            <a:off x="226317" y="765255"/>
+            <a:ext cx="4826000" cy="9940456"/>
+            <a:chOff x="1701800" y="317007"/>
+            <a:chExt cx="4826000" cy="9940456"/>
+          </a:xfrm>
+        </p:grpSpPr>
+        <p:pic>
+          <p:nvPicPr>
+            <p:cNvPr id="4" name="Picture 3" descr="bigstock-human-proportion-25048619.jpg"/>
+            <p:cNvPicPr>
+              <a:picLocks noChangeAspect="1"/>
+            </p:cNvPicPr>
+            <p:nvPr/>
+          </p:nvPicPr>
+          <p:blipFill rotWithShape="1">
+            <a:blip r:embed="rId2">
+              <a:extLst>
+                <a:ext uri="{BEBA8EAE-BF5A-486C-A8C5-ECC9F3942E4B}">
+                  <a14:imgProps xmlns:a14="http://schemas.microsoft.com/office/drawing/2010/main">
+                    <a14:imgLayer r:embed="rId3">
+                      <a14:imgEffect>
+                        <a14:backgroundRemoval t="1700" b="99600" l="37695" r="93758"/>
+                      </a14:imgEffect>
+                    </a14:imgLayer>
+                  </a14:imgProps>
+                </a:ext>
+                <a:ext uri="{28A0092B-C50C-407E-A947-70E740481C1C}">
+                  <a14:useLocalDpi xmlns:a14="http://schemas.microsoft.com/office/drawing/2010/main" val="0"/>
+                </a:ext>
+              </a:extLst>
+            </a:blip>
+            <a:srcRect l="37908"/>
+            <a:stretch/>
+          </p:blipFill>
+          <p:spPr>
+            <a:xfrm>
+              <a:off x="1701800" y="317007"/>
+              <a:ext cx="4826000" cy="9940456"/>
+            </a:xfrm>
+            <a:prstGeom prst="rect">
+              <a:avLst/>
+            </a:prstGeom>
+          </p:spPr>
+        </p:pic>
+        <p:sp>
+          <p:nvSpPr>
+            <p:cNvPr id="5" name="Rectangle 4"/>
+            <p:cNvSpPr/>
+            <p:nvPr/>
+          </p:nvSpPr>
+          <p:spPr>
+            <a:xfrm>
+              <a:off x="2630127" y="4725615"/>
+              <a:ext cx="1200960" cy="993502"/>
+            </a:xfrm>
+            <a:prstGeom prst="rect">
+              <a:avLst/>
+            </a:prstGeom>
+            <a:solidFill>
+              <a:srgbClr val="191618"/>
+            </a:solidFill>
+            <a:ln>
+              <a:noFill/>
+            </a:ln>
+            <a:effectLst/>
+          </p:spPr>
+          <p:style>
+            <a:lnRef idx="1">
+              <a:schemeClr val="accent1"/>
+            </a:lnRef>
+            <a:fillRef idx="3">
+              <a:schemeClr val="accent1"/>
+            </a:fillRef>
+            <a:effectRef idx="2">
+              <a:schemeClr val="accent1"/>
+            </a:effectRef>
+            <a:fontRef idx="minor">
+              <a:schemeClr val="lt1"/>
+            </a:fontRef>
+          </p:style>
+          <p:txBody>
+            <a:bodyPr rtlCol="0" anchor="ctr"/>
+            <a:lstStyle/>
+            <a:p>
+              <a:pPr algn="ctr"/>
+              <a:endParaRPr lang="en-US"/>
+            </a:p>
+          </p:txBody>
+        </p:sp>
+      </p:grpSp>
+      <p:cxnSp>
+        <p:nvCxnSpPr>
+          <p:cNvPr id="14" name="Straight Connector 13"/>
+          <p:cNvCxnSpPr/>
+          <p:nvPr/>
+        </p:nvCxnSpPr>
+        <p:spPr>
+          <a:xfrm>
+            <a:off x="1736973" y="4326951"/>
+            <a:ext cx="3315344" cy="0"/>
+          </a:xfrm>
+          <a:prstGeom prst="line">
+            <a:avLst/>
+          </a:prstGeom>
+          <a:ln>
+            <a:solidFill>
+              <a:srgbClr val="DF0202"/>
+            </a:solidFill>
+            <a:prstDash val="sysDash"/>
+          </a:ln>
+          <a:effectLst/>
+        </p:spPr>
+        <p:style>
+          <a:lnRef idx="2">
+            <a:schemeClr val="accent1"/>
+          </a:lnRef>
+          <a:fillRef idx="0">
+            <a:schemeClr val="accent1"/>
+          </a:fillRef>
+          <a:effectRef idx="1">
+            <a:schemeClr val="accent1"/>
+          </a:effectRef>
+          <a:fontRef idx="minor">
+            <a:schemeClr val="tx1"/>
+          </a:fontRef>
+        </p:style>
+      </p:cxnSp>
+      <p:cxnSp>
+        <p:nvCxnSpPr>
+          <p:cNvPr id="15" name="Straight Connector 14"/>
+          <p:cNvCxnSpPr/>
+          <p:nvPr/>
+        </p:nvCxnSpPr>
+        <p:spPr>
+          <a:xfrm>
+            <a:off x="1736973" y="8295922"/>
+            <a:ext cx="3315344" cy="0"/>
+          </a:xfrm>
+          <a:prstGeom prst="line">
+            <a:avLst/>
+          </a:prstGeom>
+          <a:ln>
+            <a:solidFill>
+              <a:srgbClr val="DF0202"/>
+            </a:solidFill>
+            <a:prstDash val="sysDash"/>
+          </a:ln>
+          <a:effectLst/>
+        </p:spPr>
+        <p:style>
+          <a:lnRef idx="2">
+            <a:schemeClr val="accent1"/>
+          </a:lnRef>
+          <a:fillRef idx="0">
+            <a:schemeClr val="accent1"/>
+          </a:fillRef>
+          <a:effectRef idx="1">
+            <a:schemeClr val="accent1"/>
+          </a:effectRef>
+          <a:fontRef idx="minor">
+            <a:schemeClr val="tx1"/>
+          </a:fontRef>
+        </p:style>
+      </p:cxnSp>
+      <p:cxnSp>
+        <p:nvCxnSpPr>
+          <p:cNvPr id="11" name="Straight Connector 10"/>
+          <p:cNvCxnSpPr/>
+          <p:nvPr/>
+        </p:nvCxnSpPr>
+        <p:spPr>
+          <a:xfrm>
+            <a:off x="1736973" y="10446772"/>
+            <a:ext cx="3315344" cy="0"/>
+          </a:xfrm>
+          <a:prstGeom prst="line">
+            <a:avLst/>
+          </a:prstGeom>
+          <a:ln>
+            <a:solidFill>
+              <a:srgbClr val="DF0202"/>
+            </a:solidFill>
+            <a:prstDash val="sysDash"/>
+          </a:ln>
+          <a:effectLst/>
+        </p:spPr>
+        <p:style>
+          <a:lnRef idx="2">
+            <a:schemeClr val="accent1"/>
+          </a:lnRef>
+          <a:fillRef idx="0">
+            <a:schemeClr val="accent1"/>
+          </a:fillRef>
+          <a:effectRef idx="1">
+            <a:schemeClr val="accent1"/>
+          </a:effectRef>
+          <a:fontRef idx="minor">
+            <a:schemeClr val="tx1"/>
+          </a:fontRef>
+        </p:style>
+      </p:cxnSp>
+      <p:sp>
+        <p:nvSpPr>
+          <p:cNvPr id="16" name="TextBox 15"/>
+          <p:cNvSpPr txBox="1"/>
+          <p:nvPr/>
+        </p:nvSpPr>
+        <p:spPr>
+          <a:xfrm>
+            <a:off x="5033640" y="10216732"/>
+            <a:ext cx="1096574" cy="338554"/>
+          </a:xfrm>
+          <a:prstGeom prst="rect">
+            <a:avLst/>
+          </a:prstGeom>
+          <a:noFill/>
+        </p:spPr>
+        <p:txBody>
+          <a:bodyPr wrap="none" rtlCol="0">
+            <a:spAutoFit/>
+          </a:bodyPr>
+          <a:lstStyle/>
+          <a:p>
+            <a:r>
+              <a:rPr lang="en-US" sz="1600" b="1" dirty="0" smtClean="0">
+                <a:latin typeface="Arial"/>
+                <a:cs typeface="Arial"/>
+              </a:rPr>
+              <a:t>GROUND</a:t>
+            </a:r>
+            <a:endParaRPr lang="en-US" sz="1600" b="1" dirty="0">
+              <a:latin typeface="Arial"/>
+              <a:cs typeface="Arial"/>
+            </a:endParaRPr>
+          </a:p>
+        </p:txBody>
+      </p:sp>
+      <p:sp>
+        <p:nvSpPr>
+          <p:cNvPr id="19" name="TextBox 18"/>
+          <p:cNvSpPr txBox="1"/>
+          <p:nvPr/>
+        </p:nvSpPr>
+        <p:spPr>
+          <a:xfrm>
+            <a:off x="5033640" y="8092579"/>
+            <a:ext cx="2364750" cy="338554"/>
+          </a:xfrm>
+          <a:prstGeom prst="rect">
+            <a:avLst/>
+          </a:prstGeom>
+          <a:noFill/>
+        </p:spPr>
+        <p:txBody>
+          <a:bodyPr wrap="none" rtlCol="0">
+            <a:spAutoFit/>
+          </a:bodyPr>
+          <a:lstStyle/>
+          <a:p>
+            <a:r>
+              <a:rPr lang="en-US" sz="1600" b="1" dirty="0" smtClean="0">
+                <a:latin typeface="Arial"/>
+                <a:cs typeface="Arial"/>
+              </a:rPr>
+              <a:t>PATELLA MID HEIGHT</a:t>
+            </a:r>
+          </a:p>
+        </p:txBody>
+      </p:sp>
+      <p:sp>
+        <p:nvSpPr>
+          <p:cNvPr id="20" name="TextBox 19"/>
+          <p:cNvSpPr txBox="1"/>
+          <p:nvPr/>
+        </p:nvSpPr>
+        <p:spPr>
+          <a:xfrm>
+            <a:off x="5033640" y="4123608"/>
+            <a:ext cx="2696171" cy="338554"/>
+          </a:xfrm>
+          <a:prstGeom prst="rect">
+            <a:avLst/>
+          </a:prstGeom>
+          <a:noFill/>
+        </p:spPr>
+        <p:txBody>
+          <a:bodyPr wrap="none" rtlCol="0">
+            <a:spAutoFit/>
+          </a:bodyPr>
+          <a:lstStyle/>
+          <a:p>
+            <a:r>
+              <a:rPr lang="en-US" sz="1600" b="1" dirty="0" smtClean="0">
+                <a:latin typeface="Arial"/>
+                <a:cs typeface="Arial"/>
+              </a:rPr>
+              <a:t>WAIST HEIGHT NATURAL</a:t>
+            </a:r>
+            <a:endParaRPr lang="en-US" sz="1600" b="1" dirty="0">
+              <a:latin typeface="Arial"/>
+              <a:cs typeface="Arial"/>
+            </a:endParaRPr>
+          </a:p>
+        </p:txBody>
+      </p:sp>
+    </p:spTree>
+    <p:extLst>
+      <p:ext uri="{BB962C8B-B14F-4D97-AF65-F5344CB8AC3E}">
+        <p14:creationId xmlns:p14="http://schemas.microsoft.com/office/powerpoint/2010/main" val="2008874105"/>
+      </p:ext>
+    </p:extLst>
+  </p:cSld>
+  <p:clrMapOvr>
+    <a:masterClrMapping/>
+  </p:clrMapOvr>
+  <p:timing>
+    <p:tnLst>
+      <p:par>
+        <p:cTn xmlns:p14="http://schemas.microsoft.com/office/powerpoint/2010/main" id="1" dur="indefinite" restart="never" nodeType="tmRoot"/>
+      </p:par>
+    </p:tnLst>
+  </p:timing>
+</p:sld>
+</file>
+
+<file path=ppt/slides/slide3.xml><?xml version="1.0" encoding="utf-8"?>
 <p:sld xmlns:a="http://schemas.openxmlformats.org/drawingml/2006/main" xmlns:r="http://schemas.openxmlformats.org/officeDocument/2006/relationships" xmlns:p="http://schemas.openxmlformats.org/presentationml/2006/main">
   <p:cSld>
     <p:spTree>

</xml_diff>